<commit_message>
Finish the ppt that will be presented on 2025/9/9
</commit_message>
<xml_diff>
--- a/909個咪.pptx
+++ b/909個咪.pptx
@@ -5,24 +5,26 @@
     <p:sldMasterId id="2147483648" r:id="rId1"/>
   </p:sldMasterIdLst>
   <p:notesMasterIdLst>
-    <p:notesMasterId r:id="rId17"/>
+    <p:notesMasterId r:id="rId19"/>
   </p:notesMasterIdLst>
   <p:sldIdLst>
     <p:sldId id="256" r:id="rId2"/>
     <p:sldId id="257" r:id="rId3"/>
-    <p:sldId id="259" r:id="rId4"/>
-    <p:sldId id="258" r:id="rId5"/>
-    <p:sldId id="262" r:id="rId6"/>
-    <p:sldId id="263" r:id="rId7"/>
-    <p:sldId id="264" r:id="rId8"/>
-    <p:sldId id="265" r:id="rId9"/>
-    <p:sldId id="266" r:id="rId10"/>
-    <p:sldId id="267" r:id="rId11"/>
-    <p:sldId id="260" r:id="rId12"/>
-    <p:sldId id="268" r:id="rId13"/>
-    <p:sldId id="269" r:id="rId14"/>
-    <p:sldId id="270" r:id="rId15"/>
-    <p:sldId id="261" r:id="rId16"/>
+    <p:sldId id="271" r:id="rId4"/>
+    <p:sldId id="259" r:id="rId5"/>
+    <p:sldId id="258" r:id="rId6"/>
+    <p:sldId id="262" r:id="rId7"/>
+    <p:sldId id="263" r:id="rId8"/>
+    <p:sldId id="264" r:id="rId9"/>
+    <p:sldId id="265" r:id="rId10"/>
+    <p:sldId id="266" r:id="rId11"/>
+    <p:sldId id="267" r:id="rId12"/>
+    <p:sldId id="260" r:id="rId13"/>
+    <p:sldId id="268" r:id="rId14"/>
+    <p:sldId id="269" r:id="rId15"/>
+    <p:sldId id="270" r:id="rId16"/>
+    <p:sldId id="261" r:id="rId17"/>
+    <p:sldId id="272" r:id="rId18"/>
   </p:sldIdLst>
   <p:sldSz cx="12192000" cy="6858000"/>
   <p:notesSz cx="6858000" cy="9144000"/>
@@ -211,7 +213,7 @@
           <a:p>
             <a:fld id="{141702F5-EEC7-43F1-8753-E49F1251FB00}" type="datetimeFigureOut">
               <a:rPr lang="zh-TW" altLang="en-US" smtClean="0"/>
-              <a:t>2025/9/5</a:t>
+              <a:t>2025/9/8</a:t>
             </a:fld>
             <a:endParaRPr lang="zh-TW" altLang="en-US"/>
           </a:p>
@@ -543,7 +545,7 @@
           <a:p>
             <a:fld id="{8636AB37-21CE-43C9-98D2-EEC12DC16FEF}" type="slidenum">
               <a:rPr lang="zh-TW" altLang="en-US" smtClean="0"/>
-              <a:t>5</a:t>
+              <a:t>6</a:t>
             </a:fld>
             <a:endParaRPr lang="zh-TW" altLang="en-US"/>
           </a:p>
@@ -651,7 +653,7 @@
           <a:p>
             <a:fld id="{8636AB37-21CE-43C9-98D2-EEC12DC16FEF}" type="slidenum">
               <a:rPr lang="zh-TW" altLang="en-US" smtClean="0"/>
-              <a:t>6</a:t>
+              <a:t>7</a:t>
             </a:fld>
             <a:endParaRPr lang="zh-TW" altLang="en-US"/>
           </a:p>
@@ -759,7 +761,7 @@
           <a:p>
             <a:fld id="{8636AB37-21CE-43C9-98D2-EEC12DC16FEF}" type="slidenum">
               <a:rPr lang="zh-TW" altLang="en-US" smtClean="0"/>
-              <a:t>7</a:t>
+              <a:t>8</a:t>
             </a:fld>
             <a:endParaRPr lang="zh-TW" altLang="en-US"/>
           </a:p>
@@ -867,7 +869,7 @@
           <a:p>
             <a:fld id="{8636AB37-21CE-43C9-98D2-EEC12DC16FEF}" type="slidenum">
               <a:rPr lang="zh-TW" altLang="en-US" smtClean="0"/>
-              <a:t>8</a:t>
+              <a:t>9</a:t>
             </a:fld>
             <a:endParaRPr lang="zh-TW" altLang="en-US"/>
           </a:p>
@@ -951,7 +953,7 @@
           <a:p>
             <a:fld id="{8636AB37-21CE-43C9-98D2-EEC12DC16FEF}" type="slidenum">
               <a:rPr lang="zh-TW" altLang="en-US" smtClean="0"/>
-              <a:t>10</a:t>
+              <a:t>11</a:t>
             </a:fld>
             <a:endParaRPr lang="zh-TW" altLang="en-US"/>
           </a:p>
@@ -1035,7 +1037,7 @@
           <a:p>
             <a:fld id="{8636AB37-21CE-43C9-98D2-EEC12DC16FEF}" type="slidenum">
               <a:rPr lang="zh-TW" altLang="en-US" smtClean="0"/>
-              <a:t>14</a:t>
+              <a:t>15</a:t>
             </a:fld>
             <a:endParaRPr lang="zh-TW" altLang="en-US"/>
           </a:p>
@@ -1201,7 +1203,7 @@
           <a:p>
             <a:fld id="{8F697C4A-BE63-4EF5-B0E1-B2249042B5A8}" type="datetimeFigureOut">
               <a:rPr lang="zh-TW" altLang="en-US" smtClean="0"/>
-              <a:t>2025/9/5</a:t>
+              <a:t>2025/9/8</a:t>
             </a:fld>
             <a:endParaRPr lang="zh-TW" altLang="en-US"/>
           </a:p>
@@ -1399,7 +1401,7 @@
           <a:p>
             <a:fld id="{8F697C4A-BE63-4EF5-B0E1-B2249042B5A8}" type="datetimeFigureOut">
               <a:rPr lang="zh-TW" altLang="en-US" smtClean="0"/>
-              <a:t>2025/9/5</a:t>
+              <a:t>2025/9/8</a:t>
             </a:fld>
             <a:endParaRPr lang="zh-TW" altLang="en-US"/>
           </a:p>
@@ -1607,7 +1609,7 @@
           <a:p>
             <a:fld id="{8F697C4A-BE63-4EF5-B0E1-B2249042B5A8}" type="datetimeFigureOut">
               <a:rPr lang="zh-TW" altLang="en-US" smtClean="0"/>
-              <a:t>2025/9/5</a:t>
+              <a:t>2025/9/8</a:t>
             </a:fld>
             <a:endParaRPr lang="zh-TW" altLang="en-US"/>
           </a:p>
@@ -1805,7 +1807,7 @@
           <a:p>
             <a:fld id="{8F697C4A-BE63-4EF5-B0E1-B2249042B5A8}" type="datetimeFigureOut">
               <a:rPr lang="zh-TW" altLang="en-US" smtClean="0"/>
-              <a:t>2025/9/5</a:t>
+              <a:t>2025/9/8</a:t>
             </a:fld>
             <a:endParaRPr lang="zh-TW" altLang="en-US"/>
           </a:p>
@@ -2080,7 +2082,7 @@
           <a:p>
             <a:fld id="{8F697C4A-BE63-4EF5-B0E1-B2249042B5A8}" type="datetimeFigureOut">
               <a:rPr lang="zh-TW" altLang="en-US" smtClean="0"/>
-              <a:t>2025/9/5</a:t>
+              <a:t>2025/9/8</a:t>
             </a:fld>
             <a:endParaRPr lang="zh-TW" altLang="en-US"/>
           </a:p>
@@ -2345,7 +2347,7 @@
           <a:p>
             <a:fld id="{8F697C4A-BE63-4EF5-B0E1-B2249042B5A8}" type="datetimeFigureOut">
               <a:rPr lang="zh-TW" altLang="en-US" smtClean="0"/>
-              <a:t>2025/9/5</a:t>
+              <a:t>2025/9/8</a:t>
             </a:fld>
             <a:endParaRPr lang="zh-TW" altLang="en-US"/>
           </a:p>
@@ -2757,7 +2759,7 @@
           <a:p>
             <a:fld id="{8F697C4A-BE63-4EF5-B0E1-B2249042B5A8}" type="datetimeFigureOut">
               <a:rPr lang="zh-TW" altLang="en-US" smtClean="0"/>
-              <a:t>2025/9/5</a:t>
+              <a:t>2025/9/8</a:t>
             </a:fld>
             <a:endParaRPr lang="zh-TW" altLang="en-US"/>
           </a:p>
@@ -2898,7 +2900,7 @@
           <a:p>
             <a:fld id="{8F697C4A-BE63-4EF5-B0E1-B2249042B5A8}" type="datetimeFigureOut">
               <a:rPr lang="zh-TW" altLang="en-US" smtClean="0"/>
-              <a:t>2025/9/5</a:t>
+              <a:t>2025/9/8</a:t>
             </a:fld>
             <a:endParaRPr lang="zh-TW" altLang="en-US"/>
           </a:p>
@@ -3011,7 +3013,7 @@
           <a:p>
             <a:fld id="{8F697C4A-BE63-4EF5-B0E1-B2249042B5A8}" type="datetimeFigureOut">
               <a:rPr lang="zh-TW" altLang="en-US" smtClean="0"/>
-              <a:t>2025/9/5</a:t>
+              <a:t>2025/9/8</a:t>
             </a:fld>
             <a:endParaRPr lang="zh-TW" altLang="en-US"/>
           </a:p>
@@ -3322,7 +3324,7 @@
           <a:p>
             <a:fld id="{8F697C4A-BE63-4EF5-B0E1-B2249042B5A8}" type="datetimeFigureOut">
               <a:rPr lang="zh-TW" altLang="en-US" smtClean="0"/>
-              <a:t>2025/9/5</a:t>
+              <a:t>2025/9/8</a:t>
             </a:fld>
             <a:endParaRPr lang="zh-TW" altLang="en-US"/>
           </a:p>
@@ -3610,7 +3612,7 @@
           <a:p>
             <a:fld id="{8F697C4A-BE63-4EF5-B0E1-B2249042B5A8}" type="datetimeFigureOut">
               <a:rPr lang="zh-TW" altLang="en-US" smtClean="0"/>
-              <a:t>2025/9/5</a:t>
+              <a:t>2025/9/8</a:t>
             </a:fld>
             <a:endParaRPr lang="zh-TW" altLang="en-US"/>
           </a:p>
@@ -3851,7 +3853,7 @@
           <a:p>
             <a:fld id="{8F697C4A-BE63-4EF5-B0E1-B2249042B5A8}" type="datetimeFigureOut">
               <a:rPr lang="zh-TW" altLang="en-US" smtClean="0"/>
-              <a:t>2025/9/5</a:t>
+              <a:t>2025/9/8</a:t>
             </a:fld>
             <a:endParaRPr lang="zh-TW" altLang="en-US"/>
           </a:p>
@@ -4419,6 +4421,101 @@
         <p:cNvPr id="1" name="">
           <a:extLst>
             <a:ext uri="{FF2B5EF4-FFF2-40B4-BE49-F238E27FC236}">
+              <a16:creationId xmlns:a16="http://schemas.microsoft.com/office/drawing/2014/main" id="{FF9272B5-36FF-0026-F9C0-6324F34DE4DF}"/>
+            </a:ext>
+          </a:extLst>
+        </p:cNvPr>
+        <p:cNvGrpSpPr/>
+        <p:nvPr/>
+      </p:nvGrpSpPr>
+      <p:grpSpPr>
+        <a:xfrm>
+          <a:off x="0" y="0"/>
+          <a:ext cx="0" cy="0"/>
+          <a:chOff x="0" y="0"/>
+          <a:chExt cx="0" cy="0"/>
+        </a:xfrm>
+      </p:grpSpPr>
+      <p:sp>
+        <p:nvSpPr>
+          <p:cNvPr id="2" name="標題 1">
+            <a:extLst>
+              <a:ext uri="{FF2B5EF4-FFF2-40B4-BE49-F238E27FC236}">
+                <a16:creationId xmlns:a16="http://schemas.microsoft.com/office/drawing/2014/main" id="{9C49B038-AF6F-BCAF-0614-7955B5291232}"/>
+              </a:ext>
+            </a:extLst>
+          </p:cNvPr>
+          <p:cNvSpPr>
+            <a:spLocks noGrp="1"/>
+          </p:cNvSpPr>
+          <p:nvPr>
+            <p:ph type="title"/>
+          </p:nvPr>
+        </p:nvSpPr>
+        <p:spPr/>
+        <p:txBody>
+          <a:bodyPr/>
+          <a:lstStyle/>
+          <a:p>
+            <a:r>
+              <a:rPr lang="en-US" altLang="zh-TW" dirty="0"/>
+              <a:t>Flowchart</a:t>
+            </a:r>
+            <a:endParaRPr lang="zh-TW" altLang="en-US" dirty="0"/>
+          </a:p>
+        </p:txBody>
+      </p:sp>
+      <p:pic>
+        <p:nvPicPr>
+          <p:cNvPr id="7" name="圖片 6">
+            <a:extLst>
+              <a:ext uri="{FF2B5EF4-FFF2-40B4-BE49-F238E27FC236}">
+                <a16:creationId xmlns:a16="http://schemas.microsoft.com/office/drawing/2014/main" id="{357A75AB-705A-63C0-E968-3E0CEEF5B218}"/>
+              </a:ext>
+            </a:extLst>
+          </p:cNvPr>
+          <p:cNvPicPr>
+            <a:picLocks noChangeAspect="1"/>
+          </p:cNvPicPr>
+          <p:nvPr/>
+        </p:nvPicPr>
+        <p:blipFill>
+          <a:blip r:embed="rId2"/>
+          <a:stretch>
+            <a:fillRect/>
+          </a:stretch>
+        </p:blipFill>
+        <p:spPr>
+          <a:xfrm>
+            <a:off x="3562569" y="975572"/>
+            <a:ext cx="5066862" cy="4906855"/>
+          </a:xfrm>
+          <a:prstGeom prst="rect">
+            <a:avLst/>
+          </a:prstGeom>
+        </p:spPr>
+      </p:pic>
+    </p:spTree>
+    <p:extLst>
+      <p:ext uri="{BB962C8B-B14F-4D97-AF65-F5344CB8AC3E}">
+        <p14:creationId xmlns:p14="http://schemas.microsoft.com/office/powerpoint/2010/main" val="1566405452"/>
+      </p:ext>
+    </p:extLst>
+  </p:cSld>
+  <p:clrMapOvr>
+    <a:masterClrMapping/>
+  </p:clrMapOvr>
+</p:sld>
+</file>
+
+<file path=ppt/slides/slide11.xml><?xml version="1.0" encoding="utf-8"?>
+<p:sld xmlns:a="http://schemas.openxmlformats.org/drawingml/2006/main" xmlns:r="http://schemas.openxmlformats.org/officeDocument/2006/relationships" xmlns:p="http://schemas.openxmlformats.org/presentationml/2006/main">
+  <p:cSld>
+    <p:spTree>
+      <p:nvGrpSpPr>
+        <p:cNvPr id="1" name="">
+          <a:extLst>
+            <a:ext uri="{FF2B5EF4-FFF2-40B4-BE49-F238E27FC236}">
               <a16:creationId xmlns:a16="http://schemas.microsoft.com/office/drawing/2014/main" id="{7E27942B-827D-FF20-61F7-941FF8E5C4F1}"/>
             </a:ext>
           </a:extLst>
@@ -4506,7 +4603,7 @@
 </p:sld>
 </file>
 
-<file path=ppt/slides/slide11.xml><?xml version="1.0" encoding="utf-8"?>
+<file path=ppt/slides/slide12.xml><?xml version="1.0" encoding="utf-8"?>
 <p:sld xmlns:a="http://schemas.openxmlformats.org/drawingml/2006/main" xmlns:r="http://schemas.openxmlformats.org/officeDocument/2006/relationships" xmlns:p="http://schemas.openxmlformats.org/presentationml/2006/main">
   <p:cSld>
     <p:spTree>
@@ -4634,7 +4731,7 @@
 </p:sld>
 </file>
 
-<file path=ppt/slides/slide12.xml><?xml version="1.0" encoding="utf-8"?>
+<file path=ppt/slides/slide13.xml><?xml version="1.0" encoding="utf-8"?>
 <p:sld xmlns:a="http://schemas.openxmlformats.org/drawingml/2006/main" xmlns:r="http://schemas.openxmlformats.org/officeDocument/2006/relationships" xmlns:p="http://schemas.openxmlformats.org/presentationml/2006/main">
   <p:cSld>
     <p:spTree>
@@ -4939,7 +5036,7 @@
 </p:sld>
 </file>
 
-<file path=ppt/slides/slide13.xml><?xml version="1.0" encoding="utf-8"?>
+<file path=ppt/slides/slide14.xml><?xml version="1.0" encoding="utf-8"?>
 <p:sld xmlns:a="http://schemas.openxmlformats.org/drawingml/2006/main" xmlns:r="http://schemas.openxmlformats.org/officeDocument/2006/relationships" xmlns:p="http://schemas.openxmlformats.org/presentationml/2006/main">
   <p:cSld>
     <p:spTree>
@@ -5064,7 +5161,7 @@
 </p:sld>
 </file>
 
-<file path=ppt/slides/slide14.xml><?xml version="1.0" encoding="utf-8"?>
+<file path=ppt/slides/slide15.xml><?xml version="1.0" encoding="utf-8"?>
 <p:sld xmlns:a="http://schemas.openxmlformats.org/drawingml/2006/main" xmlns:r="http://schemas.openxmlformats.org/officeDocument/2006/relationships" xmlns:p="http://schemas.openxmlformats.org/presentationml/2006/main">
   <p:cSld>
     <p:spTree>
@@ -5219,7 +5316,7 @@
 </p:sld>
 </file>
 
-<file path=ppt/slides/slide15.xml><?xml version="1.0" encoding="utf-8"?>
+<file path=ppt/slides/slide16.xml><?xml version="1.0" encoding="utf-8"?>
 <p:sld xmlns:a="http://schemas.openxmlformats.org/drawingml/2006/main" xmlns:r="http://schemas.openxmlformats.org/officeDocument/2006/relationships" xmlns:p="http://schemas.openxmlformats.org/presentationml/2006/main">
   <p:cSld>
     <p:spTree>
@@ -5342,6 +5439,134 @@
     <p:extLst>
       <p:ext uri="{BB962C8B-B14F-4D97-AF65-F5344CB8AC3E}">
         <p14:creationId xmlns:p14="http://schemas.microsoft.com/office/powerpoint/2010/main" val="3247736095"/>
+      </p:ext>
+    </p:extLst>
+  </p:cSld>
+  <p:clrMapOvr>
+    <a:masterClrMapping/>
+  </p:clrMapOvr>
+</p:sld>
+</file>
+
+<file path=ppt/slides/slide17.xml><?xml version="1.0" encoding="utf-8"?>
+<p:sld xmlns:a="http://schemas.openxmlformats.org/drawingml/2006/main" xmlns:r="http://schemas.openxmlformats.org/officeDocument/2006/relationships" xmlns:p="http://schemas.openxmlformats.org/presentationml/2006/main">
+  <p:cSld>
+    <p:spTree>
+      <p:nvGrpSpPr>
+        <p:cNvPr id="1" name="">
+          <a:extLst>
+            <a:ext uri="{FF2B5EF4-FFF2-40B4-BE49-F238E27FC236}">
+              <a16:creationId xmlns:a16="http://schemas.microsoft.com/office/drawing/2014/main" id="{82774B41-6704-6723-5E30-C1CF977EA8E9}"/>
+            </a:ext>
+          </a:extLst>
+        </p:cNvPr>
+        <p:cNvGrpSpPr/>
+        <p:nvPr/>
+      </p:nvGrpSpPr>
+      <p:grpSpPr>
+        <a:xfrm>
+          <a:off x="0" y="0"/>
+          <a:ext cx="0" cy="0"/>
+          <a:chOff x="0" y="0"/>
+          <a:chExt cx="0" cy="0"/>
+        </a:xfrm>
+      </p:grpSpPr>
+      <p:sp>
+        <p:nvSpPr>
+          <p:cNvPr id="2" name="標題 1">
+            <a:extLst>
+              <a:ext uri="{FF2B5EF4-FFF2-40B4-BE49-F238E27FC236}">
+                <a16:creationId xmlns:a16="http://schemas.microsoft.com/office/drawing/2014/main" id="{CB24C615-BA8C-EEB0-95B3-0F1DF7DE78B4}"/>
+              </a:ext>
+            </a:extLst>
+          </p:cNvPr>
+          <p:cNvSpPr>
+            <a:spLocks noGrp="1"/>
+          </p:cNvSpPr>
+          <p:nvPr>
+            <p:ph type="title"/>
+          </p:nvPr>
+        </p:nvSpPr>
+        <p:spPr/>
+        <p:txBody>
+          <a:bodyPr/>
+          <a:lstStyle/>
+          <a:p>
+            <a:pPr algn="ctr"/>
+            <a:r>
+              <a:rPr lang="en-US" altLang="zh-TW" dirty="0"/>
+              <a:t>Conclusion</a:t>
+            </a:r>
+            <a:endParaRPr lang="zh-TW" altLang="en-US" dirty="0"/>
+          </a:p>
+        </p:txBody>
+      </p:sp>
+      <p:sp>
+        <p:nvSpPr>
+          <p:cNvPr id="3" name="內容版面配置區 2">
+            <a:extLst>
+              <a:ext uri="{FF2B5EF4-FFF2-40B4-BE49-F238E27FC236}">
+                <a16:creationId xmlns:a16="http://schemas.microsoft.com/office/drawing/2014/main" id="{CD103E43-3B85-D034-42DC-D95920EC81E2}"/>
+              </a:ext>
+            </a:extLst>
+          </p:cNvPr>
+          <p:cNvSpPr>
+            <a:spLocks noGrp="1"/>
+          </p:cNvSpPr>
+          <p:nvPr>
+            <p:ph idx="1"/>
+          </p:nvPr>
+        </p:nvSpPr>
+        <p:spPr>
+          <a:xfrm>
+            <a:off x="629999" y="1825625"/>
+            <a:ext cx="11336981" cy="4351338"/>
+          </a:xfrm>
+        </p:spPr>
+        <p:txBody>
+          <a:bodyPr>
+            <a:normAutofit/>
+          </a:bodyPr>
+          <a:lstStyle/>
+          <a:p>
+            <a:pPr>
+              <a:lnSpc>
+                <a:spcPct val="100000"/>
+              </a:lnSpc>
+              <a:spcBef>
+                <a:spcPts val="600"/>
+              </a:spcBef>
+            </a:pPr>
+            <a:r>
+              <a:rPr lang="en-US" altLang="zh-TW" dirty="0"/>
+              <a:t>AFL-KD closes most of the teacher-student gap (only</a:t>
+            </a:r>
+            <a:r>
+              <a:rPr lang="zh-TW" altLang="en-US" dirty="0"/>
+              <a:t> </a:t>
+            </a:r>
+            <a:r>
+              <a:rPr lang="en-US" altLang="zh-TW" dirty="0"/>
+              <a:t>1.5pp drop in accuracy) while achieving 39x compression and no additional inference cost</a:t>
+            </a:r>
+          </a:p>
+          <a:p>
+            <a:pPr>
+              <a:lnSpc>
+                <a:spcPct val="100000"/>
+              </a:lnSpc>
+              <a:spcBef>
+                <a:spcPts val="600"/>
+              </a:spcBef>
+            </a:pPr>
+            <a:endParaRPr lang="en-US" altLang="zh-TW" dirty="0"/>
+          </a:p>
+        </p:txBody>
+      </p:sp>
+    </p:spTree>
+    <p:extLst>
+      <p:ext uri="{BB962C8B-B14F-4D97-AF65-F5344CB8AC3E}">
+        <p14:creationId xmlns:p14="http://schemas.microsoft.com/office/powerpoint/2010/main" val="1686738060"/>
       </p:ext>
     </p:extLst>
   </p:cSld>
@@ -5483,6 +5708,179 @@
         <p:cNvPr id="1" name="">
           <a:extLst>
             <a:ext uri="{FF2B5EF4-FFF2-40B4-BE49-F238E27FC236}">
+              <a16:creationId xmlns:a16="http://schemas.microsoft.com/office/drawing/2014/main" id="{11267472-BE19-1534-6725-04031EC6E197}"/>
+            </a:ext>
+          </a:extLst>
+        </p:cNvPr>
+        <p:cNvGrpSpPr/>
+        <p:nvPr/>
+      </p:nvGrpSpPr>
+      <p:grpSpPr>
+        <a:xfrm>
+          <a:off x="0" y="0"/>
+          <a:ext cx="0" cy="0"/>
+          <a:chOff x="0" y="0"/>
+          <a:chExt cx="0" cy="0"/>
+        </a:xfrm>
+      </p:grpSpPr>
+      <p:sp>
+        <p:nvSpPr>
+          <p:cNvPr id="2" name="標題 1">
+            <a:extLst>
+              <a:ext uri="{FF2B5EF4-FFF2-40B4-BE49-F238E27FC236}">
+                <a16:creationId xmlns:a16="http://schemas.microsoft.com/office/drawing/2014/main" id="{EC1831A2-6088-EFF2-10A4-D4844E7CDEBD}"/>
+              </a:ext>
+            </a:extLst>
+          </p:cNvPr>
+          <p:cNvSpPr>
+            <a:spLocks noGrp="1"/>
+          </p:cNvSpPr>
+          <p:nvPr>
+            <p:ph type="title"/>
+          </p:nvPr>
+        </p:nvSpPr>
+        <p:spPr/>
+        <p:txBody>
+          <a:bodyPr/>
+          <a:lstStyle/>
+          <a:p>
+            <a:pPr algn="ctr"/>
+            <a:r>
+              <a:rPr lang="en-US" altLang="zh-TW" dirty="0"/>
+              <a:t>Introduction</a:t>
+            </a:r>
+            <a:endParaRPr lang="zh-TW" altLang="en-US" dirty="0"/>
+          </a:p>
+        </p:txBody>
+      </p:sp>
+      <p:sp>
+        <p:nvSpPr>
+          <p:cNvPr id="3" name="內容版面配置區 2">
+            <a:extLst>
+              <a:ext uri="{FF2B5EF4-FFF2-40B4-BE49-F238E27FC236}">
+                <a16:creationId xmlns:a16="http://schemas.microsoft.com/office/drawing/2014/main" id="{6B46286B-CB21-3051-05D5-5105EE57D1DE}"/>
+              </a:ext>
+            </a:extLst>
+          </p:cNvPr>
+          <p:cNvSpPr>
+            <a:spLocks noGrp="1"/>
+          </p:cNvSpPr>
+          <p:nvPr>
+            <p:ph idx="1"/>
+          </p:nvPr>
+        </p:nvSpPr>
+        <p:spPr>
+          <a:xfrm>
+            <a:off x="629999" y="1825625"/>
+            <a:ext cx="11251063" cy="4351338"/>
+          </a:xfrm>
+        </p:spPr>
+        <p:txBody>
+          <a:bodyPr>
+            <a:normAutofit/>
+          </a:bodyPr>
+          <a:lstStyle/>
+          <a:p>
+            <a:pPr>
+              <a:lnSpc>
+                <a:spcPct val="100000"/>
+              </a:lnSpc>
+              <a:spcBef>
+                <a:spcPts val="600"/>
+              </a:spcBef>
+            </a:pPr>
+            <a:r>
+              <a:rPr lang="en-US" altLang="zh-TW" dirty="0"/>
+              <a:t>Published on </a:t>
+            </a:r>
+            <a:r>
+              <a:rPr lang="en-US" altLang="zh-TW" dirty="0">
+                <a:solidFill>
+                  <a:srgbClr val="FF0000"/>
+                </a:solidFill>
+              </a:rPr>
+              <a:t>AIPA</a:t>
+            </a:r>
+          </a:p>
+          <a:p>
+            <a:pPr>
+              <a:lnSpc>
+                <a:spcPct val="100000"/>
+              </a:lnSpc>
+              <a:spcBef>
+                <a:spcPts val="600"/>
+              </a:spcBef>
+            </a:pPr>
+            <a:r>
+              <a:rPr lang="en-US" altLang="zh-TW" dirty="0"/>
+              <a:t>Compress a 283MB </a:t>
+            </a:r>
+            <a:r>
+              <a:rPr lang="en-US" altLang="zh-TW" dirty="0" err="1"/>
+              <a:t>ResNet</a:t>
+            </a:r>
+            <a:r>
+              <a:rPr lang="en-US" altLang="zh-TW" dirty="0"/>
+              <a:t> teacher into a 7.2MB </a:t>
+            </a:r>
+            <a:r>
+              <a:rPr lang="en-US" altLang="zh-TW" dirty="0" err="1"/>
+              <a:t>MobileNet</a:t>
+            </a:r>
+            <a:r>
+              <a:rPr lang="en-US" altLang="zh-TW" dirty="0"/>
+              <a:t> student</a:t>
+            </a:r>
+          </a:p>
+          <a:p>
+            <a:pPr>
+              <a:lnSpc>
+                <a:spcPct val="100000"/>
+              </a:lnSpc>
+              <a:spcBef>
+                <a:spcPts val="600"/>
+              </a:spcBef>
+            </a:pPr>
+            <a:r>
+              <a:rPr lang="en-US" altLang="zh-TW" dirty="0"/>
+              <a:t>Introduce Adaptive Feature Logit Distillation (</a:t>
+            </a:r>
+            <a:r>
+              <a:rPr lang="en-US" altLang="zh-TW" dirty="0">
+                <a:solidFill>
+                  <a:srgbClr val="FF0000"/>
+                </a:solidFill>
+              </a:rPr>
+              <a:t>AFL-KD</a:t>
+            </a:r>
+            <a:r>
+              <a:rPr lang="en-US" altLang="zh-TW" dirty="0"/>
+              <a:t>)</a:t>
+            </a:r>
+          </a:p>
+        </p:txBody>
+      </p:sp>
+    </p:spTree>
+    <p:extLst>
+      <p:ext uri="{BB962C8B-B14F-4D97-AF65-F5344CB8AC3E}">
+        <p14:creationId xmlns:p14="http://schemas.microsoft.com/office/powerpoint/2010/main" val="2759084093"/>
+      </p:ext>
+    </p:extLst>
+  </p:cSld>
+  <p:clrMapOvr>
+    <a:masterClrMapping/>
+  </p:clrMapOvr>
+</p:sld>
+</file>
+
+<file path=ppt/slides/slide4.xml><?xml version="1.0" encoding="utf-8"?>
+<p:sld xmlns:a="http://schemas.openxmlformats.org/drawingml/2006/main" xmlns:r="http://schemas.openxmlformats.org/officeDocument/2006/relationships" xmlns:p="http://schemas.openxmlformats.org/presentationml/2006/main">
+  <p:cSld>
+    <p:spTree>
+      <p:nvGrpSpPr>
+        <p:cNvPr id="1" name="">
+          <a:extLst>
+            <a:ext uri="{FF2B5EF4-FFF2-40B4-BE49-F238E27FC236}">
               <a16:creationId xmlns:a16="http://schemas.microsoft.com/office/drawing/2014/main" id="{C9BC56C8-2633-EE11-18BE-58AFB868F977}"/>
             </a:ext>
           </a:extLst>
@@ -5605,7 +6003,7 @@
 </p:sld>
 </file>
 
-<file path=ppt/slides/slide4.xml><?xml version="1.0" encoding="utf-8"?>
+<file path=ppt/slides/slide5.xml><?xml version="1.0" encoding="utf-8"?>
 <p:sld xmlns:a="http://schemas.openxmlformats.org/drawingml/2006/main" xmlns:r="http://schemas.openxmlformats.org/officeDocument/2006/relationships" xmlns:p="http://schemas.openxmlformats.org/presentationml/2006/main">
   <p:cSld>
     <p:spTree>
@@ -5818,7 +6216,7 @@
 </p:sld>
 </file>
 
-<file path=ppt/slides/slide5.xml><?xml version="1.0" encoding="utf-8"?>
+<file path=ppt/slides/slide6.xml><?xml version="1.0" encoding="utf-8"?>
 <p:sld xmlns:a="http://schemas.openxmlformats.org/drawingml/2006/main" xmlns:r="http://schemas.openxmlformats.org/officeDocument/2006/relationships" xmlns:p="http://schemas.openxmlformats.org/presentationml/2006/main">
   <p:cSld>
     <p:spTree>
@@ -5870,8 +6268,8 @@
           </a:p>
         </p:txBody>
       </p:sp>
-      <mc:AlternateContent xmlns:mc="http://schemas.openxmlformats.org/markup-compatibility/2006">
-        <mc:Choice xmlns:a14="http://schemas.microsoft.com/office/drawing/2010/main" Requires="a14">
+      <mc:AlternateContent xmlns:mc="http://schemas.openxmlformats.org/markup-compatibility/2006" xmlns:a14="http://schemas.microsoft.com/office/drawing/2010/main">
+        <mc:Choice Requires="a14">
           <p:sp>
             <p:nvSpPr>
               <p:cNvPr id="3" name="內容版面配置區 2">
@@ -5990,7 +6388,7 @@
             </p:txBody>
           </p:sp>
         </mc:Choice>
-        <mc:Fallback>
+        <mc:Fallback xmlns="">
           <p:sp>
             <p:nvSpPr>
               <p:cNvPr id="3" name="內容版面配置區 2">
@@ -6034,8 +6432,8 @@
           </p:sp>
         </mc:Fallback>
       </mc:AlternateContent>
-      <mc:AlternateContent xmlns:mc="http://schemas.openxmlformats.org/markup-compatibility/2006">
-        <mc:Choice xmlns:a14="http://schemas.microsoft.com/office/drawing/2010/main" Requires="a14">
+      <mc:AlternateContent xmlns:mc="http://schemas.openxmlformats.org/markup-compatibility/2006" xmlns:a14="http://schemas.microsoft.com/office/drawing/2010/main">
+        <mc:Choice Requires="a14">
           <p:sp>
             <p:nvSpPr>
               <p:cNvPr id="4" name="文字方塊 3">
@@ -6251,7 +6649,7 @@
             </p:txBody>
           </p:sp>
         </mc:Choice>
-        <mc:Fallback>
+        <mc:Fallback xmlns="">
           <p:sp>
             <p:nvSpPr>
               <p:cNvPr id="4" name="文字方塊 3">
@@ -6296,8 +6694,8 @@
           </p:sp>
         </mc:Fallback>
       </mc:AlternateContent>
-      <mc:AlternateContent xmlns:mc="http://schemas.openxmlformats.org/markup-compatibility/2006">
-        <mc:Choice xmlns:a14="http://schemas.microsoft.com/office/drawing/2010/main" Requires="a14">
+      <mc:AlternateContent xmlns:mc="http://schemas.openxmlformats.org/markup-compatibility/2006" xmlns:a14="http://schemas.microsoft.com/office/drawing/2010/main">
+        <mc:Choice Requires="a14">
           <p:sp>
             <p:nvSpPr>
               <p:cNvPr id="5" name="文字方塊 4">
@@ -6326,6 +6724,7 @@
               </a:bodyPr>
               <a:lstStyle/>
               <a:p>
+                <a:pPr/>
                 <a14:m>
                   <m:oMathPara xmlns:m="http://schemas.openxmlformats.org/officeDocument/2006/math">
                     <m:oMathParaPr>
@@ -6580,7 +6979,7 @@
             </p:txBody>
           </p:sp>
         </mc:Choice>
-        <mc:Fallback>
+        <mc:Fallback xmlns="">
           <p:sp>
             <p:nvSpPr>
               <p:cNvPr id="5" name="文字方塊 4">
@@ -6638,7 +7037,7 @@
 </p:sld>
 </file>
 
-<file path=ppt/slides/slide6.xml><?xml version="1.0" encoding="utf-8"?>
+<file path=ppt/slides/slide7.xml><?xml version="1.0" encoding="utf-8"?>
 <p:sld xmlns:a="http://schemas.openxmlformats.org/drawingml/2006/main" xmlns:r="http://schemas.openxmlformats.org/officeDocument/2006/relationships" xmlns:p="http://schemas.openxmlformats.org/presentationml/2006/main">
   <p:cSld>
     <p:spTree>
@@ -6690,8 +7089,8 @@
           </a:p>
         </p:txBody>
       </p:sp>
-      <mc:AlternateContent xmlns:mc="http://schemas.openxmlformats.org/markup-compatibility/2006">
-        <mc:Choice xmlns:a14="http://schemas.microsoft.com/office/drawing/2010/main" Requires="a14">
+      <mc:AlternateContent xmlns:mc="http://schemas.openxmlformats.org/markup-compatibility/2006" xmlns:a14="http://schemas.microsoft.com/office/drawing/2010/main">
+        <mc:Choice Requires="a14">
           <p:sp>
             <p:nvSpPr>
               <p:cNvPr id="3" name="內容版面配置區 2">
@@ -6839,7 +7238,7 @@
             </p:txBody>
           </p:sp>
         </mc:Choice>
-        <mc:Fallback>
+        <mc:Fallback xmlns="">
           <p:sp>
             <p:nvSpPr>
               <p:cNvPr id="3" name="內容版面配置區 2">
@@ -6883,8 +7282,8 @@
           </p:sp>
         </mc:Fallback>
       </mc:AlternateContent>
-      <mc:AlternateContent xmlns:mc="http://schemas.openxmlformats.org/markup-compatibility/2006">
-        <mc:Choice xmlns:a14="http://schemas.microsoft.com/office/drawing/2010/main" Requires="a14">
+      <mc:AlternateContent xmlns:mc="http://schemas.openxmlformats.org/markup-compatibility/2006" xmlns:a14="http://schemas.microsoft.com/office/drawing/2010/main">
+        <mc:Choice Requires="a14">
           <p:sp>
             <p:nvSpPr>
               <p:cNvPr id="6" name="文字方塊 5">
@@ -6913,6 +7312,7 @@
               </a:bodyPr>
               <a:lstStyle/>
               <a:p>
+                <a:pPr/>
                 <a14:m>
                   <m:oMathPara xmlns:m="http://schemas.openxmlformats.org/officeDocument/2006/math">
                     <m:oMathParaPr>
@@ -7116,7 +7516,7 @@
             </p:txBody>
           </p:sp>
         </mc:Choice>
-        <mc:Fallback>
+        <mc:Fallback xmlns="">
           <p:sp>
             <p:nvSpPr>
               <p:cNvPr id="6" name="文字方塊 5">
@@ -7161,8 +7561,8 @@
           </p:sp>
         </mc:Fallback>
       </mc:AlternateContent>
-      <mc:AlternateContent xmlns:mc="http://schemas.openxmlformats.org/markup-compatibility/2006">
-        <mc:Choice xmlns:a14="http://schemas.microsoft.com/office/drawing/2010/main" Requires="a14">
+      <mc:AlternateContent xmlns:mc="http://schemas.openxmlformats.org/markup-compatibility/2006" xmlns:a14="http://schemas.microsoft.com/office/drawing/2010/main">
+        <mc:Choice Requires="a14">
           <p:sp>
             <p:nvSpPr>
               <p:cNvPr id="7" name="文字方塊 6">
@@ -7191,6 +7591,7 @@
               </a:bodyPr>
               <a:lstStyle/>
               <a:p>
+                <a:pPr/>
                 <a14:m>
                   <m:oMathPara xmlns:m="http://schemas.openxmlformats.org/officeDocument/2006/math">
                     <m:oMathParaPr>
@@ -7393,7 +7794,7 @@
             </p:txBody>
           </p:sp>
         </mc:Choice>
-        <mc:Fallback>
+        <mc:Fallback xmlns="">
           <p:sp>
             <p:nvSpPr>
               <p:cNvPr id="7" name="文字方塊 6">
@@ -7451,7 +7852,7 @@
 </p:sld>
 </file>
 
-<file path=ppt/slides/slide7.xml><?xml version="1.0" encoding="utf-8"?>
+<file path=ppt/slides/slide8.xml><?xml version="1.0" encoding="utf-8"?>
 <p:sld xmlns:a="http://schemas.openxmlformats.org/drawingml/2006/main" xmlns:r="http://schemas.openxmlformats.org/officeDocument/2006/relationships" xmlns:p="http://schemas.openxmlformats.org/presentationml/2006/main">
   <p:cSld>
     <p:spTree>
@@ -7503,8 +7904,8 @@
           </a:p>
         </p:txBody>
       </p:sp>
-      <mc:AlternateContent xmlns:mc="http://schemas.openxmlformats.org/markup-compatibility/2006">
-        <mc:Choice xmlns:a14="http://schemas.microsoft.com/office/drawing/2010/main" Requires="a14">
+      <mc:AlternateContent xmlns:mc="http://schemas.openxmlformats.org/markup-compatibility/2006" xmlns:a14="http://schemas.microsoft.com/office/drawing/2010/main">
+        <mc:Choice Requires="a14">
           <p:sp>
             <p:nvSpPr>
               <p:cNvPr id="3" name="內容版面配置區 2">
@@ -7648,7 +8049,7 @@
             </p:txBody>
           </p:sp>
         </mc:Choice>
-        <mc:Fallback>
+        <mc:Fallback xmlns="">
           <p:sp>
             <p:nvSpPr>
               <p:cNvPr id="3" name="內容版面配置區 2">
@@ -7692,8 +8093,8 @@
           </p:sp>
         </mc:Fallback>
       </mc:AlternateContent>
-      <mc:AlternateContent xmlns:mc="http://schemas.openxmlformats.org/markup-compatibility/2006">
-        <mc:Choice xmlns:a14="http://schemas.microsoft.com/office/drawing/2010/main" Requires="a14">
+      <mc:AlternateContent xmlns:mc="http://schemas.openxmlformats.org/markup-compatibility/2006" xmlns:a14="http://schemas.microsoft.com/office/drawing/2010/main">
+        <mc:Choice Requires="a14">
           <p:sp>
             <p:nvSpPr>
               <p:cNvPr id="5" name="文字方塊 4">
@@ -7827,7 +8228,7 @@
             </p:txBody>
           </p:sp>
         </mc:Choice>
-        <mc:Fallback>
+        <mc:Fallback xmlns="">
           <p:sp>
             <p:nvSpPr>
               <p:cNvPr id="5" name="文字方塊 4">
@@ -7872,8 +8273,8 @@
           </p:sp>
         </mc:Fallback>
       </mc:AlternateContent>
-      <mc:AlternateContent xmlns:mc="http://schemas.openxmlformats.org/markup-compatibility/2006">
-        <mc:Choice xmlns:a14="http://schemas.microsoft.com/office/drawing/2010/main" Requires="a14">
+      <mc:AlternateContent xmlns:mc="http://schemas.openxmlformats.org/markup-compatibility/2006" xmlns:a14="http://schemas.microsoft.com/office/drawing/2010/main">
+        <mc:Choice Requires="a14">
           <p:sp>
             <p:nvSpPr>
               <p:cNvPr id="9" name="文字方塊 8">
@@ -7902,6 +8303,7 @@
               </a:bodyPr>
               <a:lstStyle/>
               <a:p>
+                <a:pPr/>
                 <a14:m>
                   <m:oMathPara xmlns:m="http://schemas.openxmlformats.org/officeDocument/2006/math">
                     <m:oMathParaPr>
@@ -8175,7 +8577,7 @@
             </p:txBody>
           </p:sp>
         </mc:Choice>
-        <mc:Fallback>
+        <mc:Fallback xmlns="">
           <p:sp>
             <p:nvSpPr>
               <p:cNvPr id="9" name="文字方塊 8">
@@ -8233,7 +8635,7 @@
 </p:sld>
 </file>
 
-<file path=ppt/slides/slide8.xml><?xml version="1.0" encoding="utf-8"?>
+<file path=ppt/slides/slide9.xml><?xml version="1.0" encoding="utf-8"?>
 <p:sld xmlns:a="http://schemas.openxmlformats.org/drawingml/2006/main" xmlns:r="http://schemas.openxmlformats.org/officeDocument/2006/relationships" xmlns:p="http://schemas.openxmlformats.org/presentationml/2006/main">
   <p:cSld>
     <p:spTree>
@@ -8285,8 +8687,8 @@
           </a:p>
         </p:txBody>
       </p:sp>
-      <mc:AlternateContent xmlns:mc="http://schemas.openxmlformats.org/markup-compatibility/2006">
-        <mc:Choice xmlns:a14="http://schemas.microsoft.com/office/drawing/2010/main" Requires="a14">
+      <mc:AlternateContent xmlns:mc="http://schemas.openxmlformats.org/markup-compatibility/2006" xmlns:a14="http://schemas.microsoft.com/office/drawing/2010/main">
+        <mc:Choice Requires="a14">
           <p:sp>
             <p:nvSpPr>
               <p:cNvPr id="3" name="內容版面配置區 2">
@@ -8415,7 +8817,7 @@
             </p:txBody>
           </p:sp>
         </mc:Choice>
-        <mc:Fallback>
+        <mc:Fallback xmlns="">
           <p:sp>
             <p:nvSpPr>
               <p:cNvPr id="3" name="內容版面配置區 2">
@@ -8459,8 +8861,8 @@
           </p:sp>
         </mc:Fallback>
       </mc:AlternateContent>
-      <mc:AlternateContent xmlns:mc="http://schemas.openxmlformats.org/markup-compatibility/2006">
-        <mc:Choice xmlns:a14="http://schemas.microsoft.com/office/drawing/2010/main" Requires="a14">
+      <mc:AlternateContent xmlns:mc="http://schemas.openxmlformats.org/markup-compatibility/2006" xmlns:a14="http://schemas.microsoft.com/office/drawing/2010/main">
+        <mc:Choice Requires="a14">
           <p:sp>
             <p:nvSpPr>
               <p:cNvPr id="4" name="文字方塊 3">
@@ -8489,6 +8891,7 @@
               </a:bodyPr>
               <a:lstStyle/>
               <a:p>
+                <a:pPr/>
                 <a14:m>
                   <m:oMathPara xmlns:m="http://schemas.openxmlformats.org/officeDocument/2006/math">
                     <m:oMathParaPr>
@@ -8634,7 +9037,7 @@
             </p:txBody>
           </p:sp>
         </mc:Choice>
-        <mc:Fallback>
+        <mc:Fallback xmlns="">
           <p:sp>
             <p:nvSpPr>
               <p:cNvPr id="4" name="文字方塊 3">
@@ -8679,8 +9082,8 @@
           </p:sp>
         </mc:Fallback>
       </mc:AlternateContent>
-      <mc:AlternateContent xmlns:mc="http://schemas.openxmlformats.org/markup-compatibility/2006">
-        <mc:Choice xmlns:a14="http://schemas.microsoft.com/office/drawing/2010/main" Requires="a14">
+      <mc:AlternateContent xmlns:mc="http://schemas.openxmlformats.org/markup-compatibility/2006" xmlns:a14="http://schemas.microsoft.com/office/drawing/2010/main">
+        <mc:Choice Requires="a14">
           <p:sp>
             <p:nvSpPr>
               <p:cNvPr id="6" name="文字方塊 5">
@@ -8709,6 +9112,7 @@
               </a:bodyPr>
               <a:lstStyle/>
               <a:p>
+                <a:pPr/>
                 <a14:m>
                   <m:oMathPara xmlns:m="http://schemas.openxmlformats.org/officeDocument/2006/math">
                     <m:oMathParaPr>
@@ -8840,7 +9244,7 @@
             </p:txBody>
           </p:sp>
         </mc:Choice>
-        <mc:Fallback>
+        <mc:Fallback xmlns="">
           <p:sp>
             <p:nvSpPr>
               <p:cNvPr id="6" name="文字方塊 5">
@@ -8889,101 +9293,6 @@
     <p:extLst>
       <p:ext uri="{BB962C8B-B14F-4D97-AF65-F5344CB8AC3E}">
         <p14:creationId xmlns:p14="http://schemas.microsoft.com/office/powerpoint/2010/main" val="4200220345"/>
-      </p:ext>
-    </p:extLst>
-  </p:cSld>
-  <p:clrMapOvr>
-    <a:masterClrMapping/>
-  </p:clrMapOvr>
-</p:sld>
-</file>
-
-<file path=ppt/slides/slide9.xml><?xml version="1.0" encoding="utf-8"?>
-<p:sld xmlns:a="http://schemas.openxmlformats.org/drawingml/2006/main" xmlns:r="http://schemas.openxmlformats.org/officeDocument/2006/relationships" xmlns:p="http://schemas.openxmlformats.org/presentationml/2006/main">
-  <p:cSld>
-    <p:spTree>
-      <p:nvGrpSpPr>
-        <p:cNvPr id="1" name="">
-          <a:extLst>
-            <a:ext uri="{FF2B5EF4-FFF2-40B4-BE49-F238E27FC236}">
-              <a16:creationId xmlns:a16="http://schemas.microsoft.com/office/drawing/2014/main" id="{FF9272B5-36FF-0026-F9C0-6324F34DE4DF}"/>
-            </a:ext>
-          </a:extLst>
-        </p:cNvPr>
-        <p:cNvGrpSpPr/>
-        <p:nvPr/>
-      </p:nvGrpSpPr>
-      <p:grpSpPr>
-        <a:xfrm>
-          <a:off x="0" y="0"/>
-          <a:ext cx="0" cy="0"/>
-          <a:chOff x="0" y="0"/>
-          <a:chExt cx="0" cy="0"/>
-        </a:xfrm>
-      </p:grpSpPr>
-      <p:sp>
-        <p:nvSpPr>
-          <p:cNvPr id="2" name="標題 1">
-            <a:extLst>
-              <a:ext uri="{FF2B5EF4-FFF2-40B4-BE49-F238E27FC236}">
-                <a16:creationId xmlns:a16="http://schemas.microsoft.com/office/drawing/2014/main" id="{9C49B038-AF6F-BCAF-0614-7955B5291232}"/>
-              </a:ext>
-            </a:extLst>
-          </p:cNvPr>
-          <p:cNvSpPr>
-            <a:spLocks noGrp="1"/>
-          </p:cNvSpPr>
-          <p:nvPr>
-            <p:ph type="title"/>
-          </p:nvPr>
-        </p:nvSpPr>
-        <p:spPr/>
-        <p:txBody>
-          <a:bodyPr/>
-          <a:lstStyle/>
-          <a:p>
-            <a:r>
-              <a:rPr lang="en-US" altLang="zh-TW" dirty="0"/>
-              <a:t>Flowchart</a:t>
-            </a:r>
-            <a:endParaRPr lang="zh-TW" altLang="en-US" dirty="0"/>
-          </a:p>
-        </p:txBody>
-      </p:sp>
-      <p:pic>
-        <p:nvPicPr>
-          <p:cNvPr id="7" name="圖片 6">
-            <a:extLst>
-              <a:ext uri="{FF2B5EF4-FFF2-40B4-BE49-F238E27FC236}">
-                <a16:creationId xmlns:a16="http://schemas.microsoft.com/office/drawing/2014/main" id="{357A75AB-705A-63C0-E968-3E0CEEF5B218}"/>
-              </a:ext>
-            </a:extLst>
-          </p:cNvPr>
-          <p:cNvPicPr>
-            <a:picLocks noChangeAspect="1"/>
-          </p:cNvPicPr>
-          <p:nvPr/>
-        </p:nvPicPr>
-        <p:blipFill>
-          <a:blip r:embed="rId2"/>
-          <a:stretch>
-            <a:fillRect/>
-          </a:stretch>
-        </p:blipFill>
-        <p:spPr>
-          <a:xfrm>
-            <a:off x="3562569" y="975572"/>
-            <a:ext cx="5066862" cy="4906855"/>
-          </a:xfrm>
-          <a:prstGeom prst="rect">
-            <a:avLst/>
-          </a:prstGeom>
-        </p:spPr>
-      </p:pic>
-    </p:spTree>
-    <p:extLst>
-      <p:ext uri="{BB962C8B-B14F-4D97-AF65-F5344CB8AC3E}">
-        <p14:creationId xmlns:p14="http://schemas.microsoft.com/office/powerpoint/2010/main" val="1566405452"/>
       </p:ext>
     </p:extLst>
   </p:cSld>

</xml_diff>

<commit_message>
Finish 2025/9/16 meeting report
</commit_message>
<xml_diff>
--- a/909個咪.pptx
+++ b/909個咪.pptx
@@ -8125,8 +8125,8 @@
           </p:sp>
         </mc:Fallback>
       </mc:AlternateContent>
-      <mc:AlternateContent xmlns:mc="http://schemas.openxmlformats.org/markup-compatibility/2006" xmlns:a14="http://schemas.microsoft.com/office/drawing/2010/main">
-        <mc:Choice Requires="a14">
+      <mc:AlternateContent xmlns:mc="http://schemas.openxmlformats.org/markup-compatibility/2006">
+        <mc:Choice xmlns:a14="http://schemas.microsoft.com/office/drawing/2010/main" Requires="a14">
           <p:sp>
             <p:nvSpPr>
               <p:cNvPr id="5" name="文字方塊 4">
@@ -8142,7 +8142,7 @@
             <p:spPr>
               <a:xfrm>
                 <a:off x="5380803" y="2280179"/>
-                <a:ext cx="1657400" cy="557973"/>
+                <a:ext cx="1657400" cy="564578"/>
               </a:xfrm>
               <a:prstGeom prst="rect">
                 <a:avLst/>
@@ -8244,10 +8244,13 @@
                           </m:dPr>
                           <m:e>
                             <m:r>
+                              <m:rPr>
+                                <m:sty m:val="p"/>
+                              </m:rPr>
                               <a:rPr lang="en-US" altLang="zh-TW" sz="2400" i="1">
                                 <a:latin typeface="Cambria Math" panose="02040503050406030204" pitchFamily="18" charset="0"/>
                               </a:rPr>
-                              <m:t>𝑇</m:t>
+                              <m:t>S</m:t>
                             </m:r>
                           </m:e>
                         </m:d>
@@ -8260,7 +8263,7 @@
             </p:txBody>
           </p:sp>
         </mc:Choice>
-        <mc:Fallback xmlns="">
+        <mc:Fallback>
           <p:sp>
             <p:nvSpPr>
               <p:cNvPr id="5" name="文字方塊 4">
@@ -8278,7 +8281,7 @@
             <p:spPr>
               <a:xfrm>
                 <a:off x="5380803" y="2280179"/>
-                <a:ext cx="1657400" cy="557973"/>
+                <a:ext cx="1657400" cy="564578"/>
               </a:xfrm>
               <a:prstGeom prst="rect">
                 <a:avLst/>
@@ -8286,7 +8289,7 @@
               <a:blipFill>
                 <a:blip r:embed="rId4"/>
                 <a:stretch>
-                  <a:fillRect b="-21739"/>
+                  <a:fillRect b="-20430"/>
                 </a:stretch>
               </a:blipFill>
             </p:spPr>
@@ -8305,8 +8308,8 @@
           </p:sp>
         </mc:Fallback>
       </mc:AlternateContent>
-      <mc:AlternateContent xmlns:mc="http://schemas.openxmlformats.org/markup-compatibility/2006" xmlns:a14="http://schemas.microsoft.com/office/drawing/2010/main">
-        <mc:Choice Requires="a14">
+      <mc:AlternateContent xmlns:mc="http://schemas.openxmlformats.org/markup-compatibility/2006">
+        <mc:Choice xmlns:a14="http://schemas.microsoft.com/office/drawing/2010/main" Requires="a14">
           <p:sp>
             <p:nvSpPr>
               <p:cNvPr id="9" name="文字方塊 8">
@@ -8539,10 +8542,13 @@
                                 </m:dPr>
                                 <m:e>
                                   <m:r>
+                                    <m:rPr>
+                                      <m:sty m:val="p"/>
+                                    </m:rPr>
                                     <a:rPr lang="en-US" altLang="zh-TW" sz="2400" i="1">
                                       <a:latin typeface="Cambria Math" panose="02040503050406030204" pitchFamily="18" charset="0"/>
                                     </a:rPr>
-                                    <m:t>𝑇</m:t>
+                                    <m:t>S</m:t>
                                   </m:r>
                                 </m:e>
                               </m:d>
@@ -8609,7 +8615,7 @@
             </p:txBody>
           </p:sp>
         </mc:Choice>
-        <mc:Fallback xmlns="">
+        <mc:Fallback>
           <p:sp>
             <p:nvSpPr>
               <p:cNvPr id="9" name="文字方塊 8">

</xml_diff>